<commit_message>
Funcion rotado de logs
Se agrega la funcion de rotado de logs y se arregla el frontend.py dejándolo funcional
</commit_message>
<xml_diff>
--- a/Documentación/Diagrama de Clases.pptx
+++ b/Documentación/Diagrama de Clases.pptx
@@ -9,6 +9,7 @@
     <p:sldId id="257" r:id="rId3"/>
     <p:sldId id="259" r:id="rId4"/>
     <p:sldId id="258" r:id="rId5"/>
+    <p:sldId id="260" r:id="rId6"/>
   </p:sldIdLst>
   <p:sldSz cx="12192000" cy="6858000"/>
   <p:notesSz cx="6858000" cy="9144000"/>
@@ -246,7 +247,7 @@
           <a:p>
             <a:fld id="{EB32FE62-185C-4748-8A3D-5CE279890248}" type="datetimeFigureOut">
               <a:rPr lang="es-CO" smtClean="0"/>
-              <a:t>24/07/2020</a:t>
+              <a:t>6/08/2020</a:t>
             </a:fld>
             <a:endParaRPr lang="es-CO"/>
           </a:p>
@@ -416,7 +417,7 @@
           <a:p>
             <a:fld id="{EB32FE62-185C-4748-8A3D-5CE279890248}" type="datetimeFigureOut">
               <a:rPr lang="es-CO" smtClean="0"/>
-              <a:t>24/07/2020</a:t>
+              <a:t>6/08/2020</a:t>
             </a:fld>
             <a:endParaRPr lang="es-CO"/>
           </a:p>
@@ -596,7 +597,7 @@
           <a:p>
             <a:fld id="{EB32FE62-185C-4748-8A3D-5CE279890248}" type="datetimeFigureOut">
               <a:rPr lang="es-CO" smtClean="0"/>
-              <a:t>24/07/2020</a:t>
+              <a:t>6/08/2020</a:t>
             </a:fld>
             <a:endParaRPr lang="es-CO"/>
           </a:p>
@@ -766,7 +767,7 @@
           <a:p>
             <a:fld id="{EB32FE62-185C-4748-8A3D-5CE279890248}" type="datetimeFigureOut">
               <a:rPr lang="es-CO" smtClean="0"/>
-              <a:t>24/07/2020</a:t>
+              <a:t>6/08/2020</a:t>
             </a:fld>
             <a:endParaRPr lang="es-CO"/>
           </a:p>
@@ -1012,7 +1013,7 @@
           <a:p>
             <a:fld id="{EB32FE62-185C-4748-8A3D-5CE279890248}" type="datetimeFigureOut">
               <a:rPr lang="es-CO" smtClean="0"/>
-              <a:t>24/07/2020</a:t>
+              <a:t>6/08/2020</a:t>
             </a:fld>
             <a:endParaRPr lang="es-CO"/>
           </a:p>
@@ -1244,7 +1245,7 @@
           <a:p>
             <a:fld id="{EB32FE62-185C-4748-8A3D-5CE279890248}" type="datetimeFigureOut">
               <a:rPr lang="es-CO" smtClean="0"/>
-              <a:t>24/07/2020</a:t>
+              <a:t>6/08/2020</a:t>
             </a:fld>
             <a:endParaRPr lang="es-CO"/>
           </a:p>
@@ -1611,7 +1612,7 @@
           <a:p>
             <a:fld id="{EB32FE62-185C-4748-8A3D-5CE279890248}" type="datetimeFigureOut">
               <a:rPr lang="es-CO" smtClean="0"/>
-              <a:t>24/07/2020</a:t>
+              <a:t>6/08/2020</a:t>
             </a:fld>
             <a:endParaRPr lang="es-CO"/>
           </a:p>
@@ -1729,7 +1730,7 @@
           <a:p>
             <a:fld id="{EB32FE62-185C-4748-8A3D-5CE279890248}" type="datetimeFigureOut">
               <a:rPr lang="es-CO" smtClean="0"/>
-              <a:t>24/07/2020</a:t>
+              <a:t>6/08/2020</a:t>
             </a:fld>
             <a:endParaRPr lang="es-CO"/>
           </a:p>
@@ -1824,7 +1825,7 @@
           <a:p>
             <a:fld id="{EB32FE62-185C-4748-8A3D-5CE279890248}" type="datetimeFigureOut">
               <a:rPr lang="es-CO" smtClean="0"/>
-              <a:t>24/07/2020</a:t>
+              <a:t>6/08/2020</a:t>
             </a:fld>
             <a:endParaRPr lang="es-CO"/>
           </a:p>
@@ -2101,7 +2102,7 @@
           <a:p>
             <a:fld id="{EB32FE62-185C-4748-8A3D-5CE279890248}" type="datetimeFigureOut">
               <a:rPr lang="es-CO" smtClean="0"/>
-              <a:t>24/07/2020</a:t>
+              <a:t>6/08/2020</a:t>
             </a:fld>
             <a:endParaRPr lang="es-CO"/>
           </a:p>
@@ -2354,7 +2355,7 @@
           <a:p>
             <a:fld id="{EB32FE62-185C-4748-8A3D-5CE279890248}" type="datetimeFigureOut">
               <a:rPr lang="es-CO" smtClean="0"/>
-              <a:t>24/07/2020</a:t>
+              <a:t>6/08/2020</a:t>
             </a:fld>
             <a:endParaRPr lang="es-CO"/>
           </a:p>
@@ -2567,7 +2568,7 @@
           <a:p>
             <a:fld id="{EB32FE62-185C-4748-8A3D-5CE279890248}" type="datetimeFigureOut">
               <a:rPr lang="es-CO" smtClean="0"/>
-              <a:t>24/07/2020</a:t>
+              <a:t>6/08/2020</a:t>
             </a:fld>
             <a:endParaRPr lang="es-CO"/>
           </a:p>
@@ -3809,7 +3810,6 @@
                 <a:rPr lang="es-CO" sz="1400" dirty="0" smtClean="0"/>
                 <a:t>()</a:t>
               </a:r>
-              <a:endParaRPr lang="es-CO" sz="1400" dirty="0" smtClean="0"/>
             </a:p>
             <a:p>
               <a:r>
@@ -4089,7 +4089,6 @@
                 <a:rPr lang="es-CO" sz="1400" dirty="0" smtClean="0"/>
                 <a:t>()</a:t>
               </a:r>
-              <a:endParaRPr lang="es-CO" sz="1400" dirty="0" smtClean="0"/>
             </a:p>
             <a:p>
               <a:r>
@@ -5579,11 +5578,7 @@
             <a:pPr algn="ctr"/>
             <a:r>
               <a:rPr lang="es-ES" dirty="0" smtClean="0"/>
-              <a:t>Objeto: </a:t>
-            </a:r>
-            <a:r>
-              <a:rPr lang="es-ES" dirty="0" smtClean="0"/>
-              <a:t>NxClient.log</a:t>
+              <a:t>Objeto: NxClient.log</a:t>
             </a:r>
             <a:endParaRPr lang="es-CO" dirty="0"/>
           </a:p>
@@ -6870,6 +6865,215 @@
     <p:extLst>
       <p:ext uri="{BB962C8B-B14F-4D97-AF65-F5344CB8AC3E}">
         <p14:creationId xmlns:p14="http://schemas.microsoft.com/office/powerpoint/2010/main" val="2556638571"/>
+      </p:ext>
+    </p:extLst>
+  </p:cSld>
+  <p:clrMapOvr>
+    <a:masterClrMapping/>
+  </p:clrMapOvr>
+  <p:timing>
+    <p:tnLst>
+      <p:par>
+        <p:cTn id="1" dur="indefinite" restart="never" nodeType="tmRoot"/>
+      </p:par>
+    </p:tnLst>
+  </p:timing>
+</p:sld>
+</file>
+
+<file path=ppt/slides/slide5.xml><?xml version="1.0" encoding="utf-8"?>
+<p:sld xmlns:a="http://schemas.openxmlformats.org/drawingml/2006/main" xmlns:r="http://schemas.openxmlformats.org/officeDocument/2006/relationships" xmlns:p="http://schemas.openxmlformats.org/presentationml/2006/main">
+  <p:cSld>
+    <p:spTree>
+      <p:nvGrpSpPr>
+        <p:cNvPr id="1" name=""/>
+        <p:cNvGrpSpPr/>
+        <p:nvPr/>
+      </p:nvGrpSpPr>
+      <p:grpSpPr>
+        <a:xfrm>
+          <a:off x="0" y="0"/>
+          <a:ext cx="0" cy="0"/>
+          <a:chOff x="0" y="0"/>
+          <a:chExt cx="0" cy="0"/>
+        </a:xfrm>
+      </p:grpSpPr>
+      <p:sp>
+        <p:nvSpPr>
+          <p:cNvPr id="4" name="Elipse 3"/>
+          <p:cNvSpPr/>
+          <p:nvPr/>
+        </p:nvSpPr>
+        <p:spPr>
+          <a:xfrm>
+            <a:off x="5527343" y="777922"/>
+            <a:ext cx="136478" cy="232012"/>
+          </a:xfrm>
+          <a:prstGeom prst="ellipse">
+            <a:avLst/>
+          </a:prstGeom>
+        </p:spPr>
+        <p:style>
+          <a:lnRef idx="2">
+            <a:schemeClr val="accent1">
+              <a:shade val="50000"/>
+            </a:schemeClr>
+          </a:lnRef>
+          <a:fillRef idx="1">
+            <a:schemeClr val="accent1"/>
+          </a:fillRef>
+          <a:effectRef idx="0">
+            <a:schemeClr val="accent1"/>
+          </a:effectRef>
+          <a:fontRef idx="minor">
+            <a:schemeClr val="lt1"/>
+          </a:fontRef>
+        </p:style>
+        <p:txBody>
+          <a:bodyPr rtlCol="0" anchor="ctr"/>
+          <a:lstStyle/>
+          <a:p>
+            <a:pPr algn="ctr"/>
+            <a:endParaRPr lang="es-CO"/>
+          </a:p>
+        </p:txBody>
+      </p:sp>
+      <p:cxnSp>
+        <p:nvCxnSpPr>
+          <p:cNvPr id="6" name="Conector recto de flecha 5"/>
+          <p:cNvCxnSpPr>
+            <a:stCxn id="4" idx="4"/>
+          </p:cNvCxnSpPr>
+          <p:nvPr/>
+        </p:nvCxnSpPr>
+        <p:spPr>
+          <a:xfrm flipH="1">
+            <a:off x="5554639" y="1009934"/>
+            <a:ext cx="40943" cy="300251"/>
+          </a:xfrm>
+          <a:prstGeom prst="straightConnector1">
+            <a:avLst/>
+          </a:prstGeom>
+          <a:ln>
+            <a:tailEnd type="triangle"/>
+          </a:ln>
+        </p:spPr>
+        <p:style>
+          <a:lnRef idx="1">
+            <a:schemeClr val="accent1"/>
+          </a:lnRef>
+          <a:fillRef idx="0">
+            <a:schemeClr val="accent1"/>
+          </a:fillRef>
+          <a:effectRef idx="0">
+            <a:schemeClr val="accent1"/>
+          </a:effectRef>
+          <a:fontRef idx="minor">
+            <a:schemeClr val="tx1"/>
+          </a:fontRef>
+        </p:style>
+      </p:cxnSp>
+      <p:sp>
+        <p:nvSpPr>
+          <p:cNvPr id="7" name="CuadroTexto 6"/>
+          <p:cNvSpPr txBox="1"/>
+          <p:nvPr/>
+        </p:nvSpPr>
+        <p:spPr>
+          <a:xfrm>
+            <a:off x="5172501" y="1460310"/>
+            <a:ext cx="1542198" cy="923330"/>
+          </a:xfrm>
+          <a:prstGeom prst="rect">
+            <a:avLst/>
+          </a:prstGeom>
+          <a:noFill/>
+        </p:spPr>
+        <p:txBody>
+          <a:bodyPr wrap="square" rtlCol="0">
+            <a:spAutoFit/>
+          </a:bodyPr>
+          <a:lstStyle/>
+          <a:p>
+            <a:r>
+              <a:rPr lang="es-ES" dirty="0" err="1" smtClean="0"/>
+              <a:t>Dia</a:t>
+            </a:r>
+            <a:r>
+              <a:rPr lang="es-ES" dirty="0" smtClean="0"/>
+              <a:t>=</a:t>
+            </a:r>
+            <a:r>
+              <a:rPr lang="es-ES" dirty="0" err="1" smtClean="0"/>
+              <a:t>dia</a:t>
+            </a:r>
+            <a:endParaRPr lang="es-ES" dirty="0" smtClean="0"/>
+          </a:p>
+          <a:p>
+            <a:r>
+              <a:rPr lang="es-ES" dirty="0" err="1" smtClean="0"/>
+              <a:t>Sleep</a:t>
+            </a:r>
+            <a:r>
+              <a:rPr lang="es-ES" dirty="0" smtClean="0"/>
+              <a:t>()</a:t>
+            </a:r>
+          </a:p>
+          <a:p>
+            <a:endParaRPr lang="es-CO" dirty="0"/>
+          </a:p>
+        </p:txBody>
+      </p:sp>
+      <p:sp>
+        <p:nvSpPr>
+          <p:cNvPr id="8" name="CuadroTexto 7"/>
+          <p:cNvSpPr txBox="1"/>
+          <p:nvPr/>
+        </p:nvSpPr>
+        <p:spPr>
+          <a:xfrm>
+            <a:off x="5145206" y="2036885"/>
+            <a:ext cx="1475084" cy="369332"/>
+          </a:xfrm>
+          <a:prstGeom prst="rect">
+            <a:avLst/>
+          </a:prstGeom>
+          <a:noFill/>
+        </p:spPr>
+        <p:txBody>
+          <a:bodyPr wrap="none" rtlCol="0">
+            <a:spAutoFit/>
+          </a:bodyPr>
+          <a:lstStyle/>
+          <a:p>
+            <a:r>
+              <a:rPr lang="es-ES" dirty="0" smtClean="0"/>
+              <a:t>Es el </a:t>
+            </a:r>
+            <a:r>
+              <a:rPr lang="es-ES" dirty="0" err="1" smtClean="0"/>
+              <a:t>Dia</a:t>
+            </a:r>
+            <a:r>
+              <a:rPr lang="es-ES" dirty="0" smtClean="0"/>
+              <a:t>=</a:t>
+            </a:r>
+            <a:r>
+              <a:rPr lang="es-ES" dirty="0" err="1" smtClean="0"/>
+              <a:t>dia</a:t>
+            </a:r>
+            <a:r>
+              <a:rPr lang="es-ES" dirty="0" smtClean="0"/>
+              <a:t>?</a:t>
+            </a:r>
+            <a:endParaRPr lang="es-CO" dirty="0"/>
+          </a:p>
+        </p:txBody>
+      </p:sp>
+    </p:spTree>
+    <p:extLst>
+      <p:ext uri="{BB962C8B-B14F-4D97-AF65-F5344CB8AC3E}">
+        <p14:creationId xmlns:p14="http://schemas.microsoft.com/office/powerpoint/2010/main" val="4068485366"/>
       </p:ext>
     </p:extLst>
   </p:cSld>

</xml_diff>